<commit_message>
Update DG Diagram, use case, links to TOC, implementation, removed appendix A
</commit_message>
<xml_diff>
--- a/docs/diagrams/JournalWindowUIComponentSequenceDiagram.pptx
+++ b/docs/diagrams/JournalWindowUIComponentSequenceDiagram.pptx
@@ -212,7 +212,7 @@
           <a:p>
             <a:fld id="{F5CC4B3F-88C1-4FFA-B1B6-F41C21DC6924}" type="datetimeFigureOut">
               <a:rPr lang="en-US" smtClean="0"/>
-              <a:t>3/22/2018</a:t>
+              <a:t>3/26/2018</a:t>
             </a:fld>
             <a:endParaRPr lang="en-US" dirty="0"/>
           </a:p>
@@ -658,7 +658,7 @@
           <a:p>
             <a:fld id="{78C97017-6FC3-485B-9764-EAC9E56C1D49}" type="datetimeFigureOut">
               <a:rPr lang="en-US" smtClean="0"/>
-              <a:t>3/22/2018</a:t>
+              <a:t>3/26/2018</a:t>
             </a:fld>
             <a:endParaRPr lang="en-US" dirty="0"/>
           </a:p>
@@ -826,7 +826,7 @@
           <a:p>
             <a:fld id="{78C97017-6FC3-485B-9764-EAC9E56C1D49}" type="datetimeFigureOut">
               <a:rPr lang="en-US" smtClean="0"/>
-              <a:t>3/22/2018</a:t>
+              <a:t>3/26/2018</a:t>
             </a:fld>
             <a:endParaRPr lang="en-US" dirty="0"/>
           </a:p>
@@ -1004,7 +1004,7 @@
           <a:p>
             <a:fld id="{78C97017-6FC3-485B-9764-EAC9E56C1D49}" type="datetimeFigureOut">
               <a:rPr lang="en-US" smtClean="0"/>
-              <a:t>3/22/2018</a:t>
+              <a:t>3/26/2018</a:t>
             </a:fld>
             <a:endParaRPr lang="en-US" dirty="0"/>
           </a:p>
@@ -1172,7 +1172,7 @@
           <a:p>
             <a:fld id="{78C97017-6FC3-485B-9764-EAC9E56C1D49}" type="datetimeFigureOut">
               <a:rPr lang="en-US" smtClean="0"/>
-              <a:t>3/22/2018</a:t>
+              <a:t>3/26/2018</a:t>
             </a:fld>
             <a:endParaRPr lang="en-US" dirty="0"/>
           </a:p>
@@ -1417,7 +1417,7 @@
           <a:p>
             <a:fld id="{78C97017-6FC3-485B-9764-EAC9E56C1D49}" type="datetimeFigureOut">
               <a:rPr lang="en-US" smtClean="0"/>
-              <a:t>3/22/2018</a:t>
+              <a:t>3/26/2018</a:t>
             </a:fld>
             <a:endParaRPr lang="en-US" dirty="0"/>
           </a:p>
@@ -1702,7 +1702,7 @@
           <a:p>
             <a:fld id="{78C97017-6FC3-485B-9764-EAC9E56C1D49}" type="datetimeFigureOut">
               <a:rPr lang="en-US" smtClean="0"/>
-              <a:t>3/22/2018</a:t>
+              <a:t>3/26/2018</a:t>
             </a:fld>
             <a:endParaRPr lang="en-US" dirty="0"/>
           </a:p>
@@ -2121,7 +2121,7 @@
           <a:p>
             <a:fld id="{78C97017-6FC3-485B-9764-EAC9E56C1D49}" type="datetimeFigureOut">
               <a:rPr lang="en-US" smtClean="0"/>
-              <a:t>3/22/2018</a:t>
+              <a:t>3/26/2018</a:t>
             </a:fld>
             <a:endParaRPr lang="en-US" dirty="0"/>
           </a:p>
@@ -2238,7 +2238,7 @@
           <a:p>
             <a:fld id="{78C97017-6FC3-485B-9764-EAC9E56C1D49}" type="datetimeFigureOut">
               <a:rPr lang="en-US" smtClean="0"/>
-              <a:t>3/22/2018</a:t>
+              <a:t>3/26/2018</a:t>
             </a:fld>
             <a:endParaRPr lang="en-US" dirty="0"/>
           </a:p>
@@ -2333,7 +2333,7 @@
           <a:p>
             <a:fld id="{78C97017-6FC3-485B-9764-EAC9E56C1D49}" type="datetimeFigureOut">
               <a:rPr lang="en-US" smtClean="0"/>
-              <a:t>3/22/2018</a:t>
+              <a:t>3/26/2018</a:t>
             </a:fld>
             <a:endParaRPr lang="en-US" dirty="0"/>
           </a:p>
@@ -2608,7 +2608,7 @@
           <a:p>
             <a:fld id="{78C97017-6FC3-485B-9764-EAC9E56C1D49}" type="datetimeFigureOut">
               <a:rPr lang="en-US" smtClean="0"/>
-              <a:t>3/22/2018</a:t>
+              <a:t>3/26/2018</a:t>
             </a:fld>
             <a:endParaRPr lang="en-US" dirty="0"/>
           </a:p>
@@ -2860,7 +2860,7 @@
           <a:p>
             <a:fld id="{78C97017-6FC3-485B-9764-EAC9E56C1D49}" type="datetimeFigureOut">
               <a:rPr lang="en-US" smtClean="0"/>
-              <a:t>3/22/2018</a:t>
+              <a:t>3/26/2018</a:t>
             </a:fld>
             <a:endParaRPr lang="en-US" dirty="0"/>
           </a:p>
@@ -3071,7 +3071,7 @@
           <a:p>
             <a:fld id="{78C97017-6FC3-485B-9764-EAC9E56C1D49}" type="datetimeFigureOut">
               <a:rPr lang="en-US" smtClean="0"/>
-              <a:t>3/22/2018</a:t>
+              <a:t>3/26/2018</a:t>
             </a:fld>
             <a:endParaRPr lang="en-US" dirty="0"/>
           </a:p>
@@ -3454,7 +3454,7 @@
         </p:nvSpPr>
         <p:spPr>
           <a:xfrm>
-            <a:off x="687442" y="1958865"/>
+            <a:off x="1066800" y="1524000"/>
             <a:ext cx="5849905" cy="4000286"/>
           </a:xfrm>
           <a:prstGeom prst="roundRect">
@@ -3515,7 +3515,7 @@
         </p:nvSpPr>
         <p:spPr>
           <a:xfrm>
-            <a:off x="845045" y="2362200"/>
+            <a:off x="1224403" y="1927335"/>
             <a:ext cx="1455629" cy="281106"/>
           </a:xfrm>
           <a:prstGeom prst="rect">
@@ -3574,7 +3574,7 @@
         </p:nvCxnSpPr>
         <p:spPr>
           <a:xfrm>
-            <a:off x="1572859" y="2660217"/>
+            <a:off x="1952217" y="2225352"/>
             <a:ext cx="0" cy="2597583"/>
           </a:xfrm>
           <a:prstGeom prst="line">
@@ -3611,7 +3611,7 @@
         </p:nvSpPr>
         <p:spPr>
           <a:xfrm>
-            <a:off x="1500851" y="3010911"/>
+            <a:off x="1880209" y="2576046"/>
             <a:ext cx="152400" cy="2780287"/>
           </a:xfrm>
           <a:prstGeom prst="rect">
@@ -3658,7 +3658,7 @@
         </p:nvSpPr>
         <p:spPr>
           <a:xfrm>
-            <a:off x="2590800" y="2385060"/>
+            <a:off x="2970158" y="1950195"/>
             <a:ext cx="762000" cy="261932"/>
           </a:xfrm>
           <a:prstGeom prst="rect">
@@ -3717,7 +3717,7 @@
         </p:nvCxnSpPr>
         <p:spPr>
           <a:xfrm>
-            <a:off x="2960616" y="2663904"/>
+            <a:off x="3339974" y="2229039"/>
             <a:ext cx="22368" cy="3515691"/>
           </a:xfrm>
           <a:prstGeom prst="line">
@@ -3754,7 +3754,7 @@
         </p:nvSpPr>
         <p:spPr>
           <a:xfrm>
-            <a:off x="2889627" y="3059899"/>
+            <a:off x="3268985" y="2625034"/>
             <a:ext cx="158374" cy="409285"/>
           </a:xfrm>
           <a:prstGeom prst="rect">
@@ -3805,7 +3805,7 @@
         </p:nvSpPr>
         <p:spPr>
           <a:xfrm>
-            <a:off x="4370740" y="3764280"/>
+            <a:off x="4750098" y="3329415"/>
             <a:ext cx="1599329" cy="240123"/>
           </a:xfrm>
           <a:prstGeom prst="rect">
@@ -3866,8 +3866,8 @@
         </p:nvCxnSpPr>
         <p:spPr>
           <a:xfrm flipH="1">
-            <a:off x="5179304" y="4007241"/>
-            <a:ext cx="9749" cy="1250559"/>
+            <a:off x="5558663" y="3572377"/>
+            <a:ext cx="1484" cy="1250558"/>
           </a:xfrm>
           <a:prstGeom prst="line">
             <a:avLst/>
@@ -3903,8 +3903,8 @@
         </p:nvSpPr>
         <p:spPr>
           <a:xfrm>
-            <a:off x="5109206" y="4007241"/>
-            <a:ext cx="159693" cy="1021959"/>
+            <a:off x="5488564" y="3572377"/>
+            <a:ext cx="143165" cy="387108"/>
           </a:xfrm>
           <a:prstGeom prst="rect">
             <a:avLst/>
@@ -3950,7 +3950,7 @@
         </p:nvCxnSpPr>
         <p:spPr>
           <a:xfrm>
-            <a:off x="381000" y="3014599"/>
+            <a:off x="760358" y="2579734"/>
             <a:ext cx="1119851" cy="0"/>
           </a:xfrm>
           <a:prstGeom prst="straightConnector1">
@@ -3986,7 +3986,7 @@
         </p:nvCxnSpPr>
         <p:spPr>
           <a:xfrm>
-            <a:off x="1508471" y="3060694"/>
+            <a:off x="1887829" y="2625829"/>
             <a:ext cx="1376830" cy="2546"/>
           </a:xfrm>
           <a:prstGeom prst="straightConnector1">
@@ -4022,7 +4022,7 @@
         </p:nvSpPr>
         <p:spPr>
           <a:xfrm>
-            <a:off x="0" y="2743200"/>
+            <a:off x="379358" y="2308335"/>
             <a:ext cx="1424846" cy="215444"/>
           </a:xfrm>
           <a:prstGeom prst="rect">
@@ -4061,7 +4061,7 @@
         </p:nvSpPr>
         <p:spPr>
           <a:xfrm>
-            <a:off x="1979524" y="3640074"/>
+            <a:off x="2358882" y="3205209"/>
             <a:ext cx="855809" cy="215444"/>
           </a:xfrm>
           <a:prstGeom prst="rect">
@@ -4103,7 +4103,7 @@
         </p:nvCxnSpPr>
         <p:spPr>
           <a:xfrm>
-            <a:off x="1653251" y="3469184"/>
+            <a:off x="2032609" y="3034319"/>
             <a:ext cx="1315563" cy="0"/>
           </a:xfrm>
           <a:prstGeom prst="straightConnector1">
@@ -4141,7 +4141,7 @@
         </p:nvCxnSpPr>
         <p:spPr>
           <a:xfrm>
-            <a:off x="304800" y="5791200"/>
+            <a:off x="684158" y="5356335"/>
             <a:ext cx="1196051" cy="0"/>
           </a:xfrm>
           <a:prstGeom prst="straightConnector1">
@@ -4179,7 +4179,7 @@
         </p:nvSpPr>
         <p:spPr>
           <a:xfrm>
-            <a:off x="6843789" y="2407488"/>
+            <a:off x="7223147" y="1972623"/>
             <a:ext cx="878104" cy="346760"/>
           </a:xfrm>
           <a:prstGeom prst="rect">
@@ -4226,7 +4226,7 @@
                   <a:schemeClr val="bg1"/>
                 </a:solidFill>
               </a:rPr>
-              <a:t>:UI</a:t>
+              <a:t>:Model</a:t>
             </a:r>
             <a:endParaRPr lang="en-SG" sz="1600" dirty="0">
               <a:solidFill>
@@ -4244,7 +4244,7 @@
         </p:nvCxnSpPr>
         <p:spPr>
           <a:xfrm>
-            <a:off x="7294753" y="2766995"/>
+            <a:off x="7674111" y="2332130"/>
             <a:ext cx="0" cy="2830598"/>
           </a:xfrm>
           <a:prstGeom prst="line">
@@ -4276,63 +4276,6 @@
           </a:fontRef>
         </p:style>
       </p:cxnSp>
-      <p:sp>
-        <p:nvSpPr>
-          <p:cNvPr id="73" name="Rectangle 72"/>
-          <p:cNvSpPr/>
-          <p:nvPr/>
-        </p:nvSpPr>
-        <p:spPr>
-          <a:xfrm>
-            <a:off x="7226884" y="4500243"/>
-            <a:ext cx="152400" cy="199803"/>
-          </a:xfrm>
-          <a:prstGeom prst="rect">
-            <a:avLst/>
-          </a:prstGeom>
-          <a:solidFill>
-            <a:schemeClr val="accent4">
-              <a:lumMod val="60000"/>
-              <a:lumOff val="40000"/>
-            </a:schemeClr>
-          </a:solidFill>
-          <a:ln>
-            <a:solidFill>
-              <a:schemeClr val="accent4">
-                <a:lumMod val="60000"/>
-                <a:lumOff val="40000"/>
-              </a:schemeClr>
-            </a:solidFill>
-          </a:ln>
-          <a:effectLst/>
-        </p:spPr>
-        <p:style>
-          <a:lnRef idx="1">
-            <a:schemeClr val="accent3"/>
-          </a:lnRef>
-          <a:fillRef idx="2">
-            <a:schemeClr val="accent3"/>
-          </a:fillRef>
-          <a:effectRef idx="1">
-            <a:schemeClr val="accent3"/>
-          </a:effectRef>
-          <a:fontRef idx="minor">
-            <a:schemeClr val="dk1"/>
-          </a:fontRef>
-        </p:style>
-        <p:txBody>
-          <a:bodyPr rtlCol="0" anchor="ctr"/>
-          <a:lstStyle/>
-          <a:p>
-            <a:pPr algn="ctr"/>
-            <a:endParaRPr lang="en-SG" sz="1400" dirty="0">
-              <a:solidFill>
-                <a:schemeClr val="dk1"/>
-              </a:solidFill>
-            </a:endParaRPr>
-          </a:p>
-        </p:txBody>
-      </p:sp>
       <p:cxnSp>
         <p:nvCxnSpPr>
           <p:cNvPr id="75" name="Straight Arrow Connector 74"/>
@@ -4341,7 +4284,7 @@
         </p:nvCxnSpPr>
         <p:spPr>
           <a:xfrm flipV="1">
-            <a:off x="5252371" y="4504909"/>
+            <a:off x="5631729" y="3950060"/>
             <a:ext cx="1972418" cy="4196"/>
           </a:xfrm>
           <a:prstGeom prst="straightConnector1">
@@ -4369,95 +4312,16 @@
           </a:fontRef>
         </p:style>
       </p:cxnSp>
-      <p:cxnSp>
-        <p:nvCxnSpPr>
-          <p:cNvPr id="76" name="Straight Arrow Connector 75"/>
-          <p:cNvCxnSpPr/>
-          <p:nvPr/>
-        </p:nvCxnSpPr>
-        <p:spPr>
-          <a:xfrm>
-            <a:off x="5271657" y="4689336"/>
-            <a:ext cx="1953132" cy="4584"/>
-          </a:xfrm>
-          <a:prstGeom prst="straightConnector1">
-            <a:avLst/>
-          </a:prstGeom>
-          <a:ln w="19050">
-            <a:solidFill>
-              <a:schemeClr val="accent4">
-                <a:lumMod val="60000"/>
-                <a:lumOff val="40000"/>
-              </a:schemeClr>
-            </a:solidFill>
-            <a:prstDash val="sysDash"/>
-            <a:headEnd type="arrow" w="med" len="med"/>
-            <a:tailEnd type="none" w="med" len="med"/>
-          </a:ln>
-        </p:spPr>
-        <p:style>
-          <a:lnRef idx="1">
-            <a:schemeClr val="accent1"/>
-          </a:lnRef>
-          <a:fillRef idx="0">
-            <a:schemeClr val="accent1"/>
-          </a:fillRef>
-          <a:effectRef idx="0">
-            <a:schemeClr val="accent1"/>
-          </a:effectRef>
-          <a:fontRef idx="minor">
-            <a:schemeClr val="tx1"/>
-          </a:fontRef>
-        </p:style>
-      </p:cxnSp>
-      <p:cxnSp>
-        <p:nvCxnSpPr>
-          <p:cNvPr id="77" name="Straight Arrow Connector 76"/>
-          <p:cNvCxnSpPr/>
-          <p:nvPr/>
-        </p:nvCxnSpPr>
-        <p:spPr>
-          <a:xfrm>
-            <a:off x="1634345" y="5017008"/>
-            <a:ext cx="3536059" cy="0"/>
-          </a:xfrm>
-          <a:prstGeom prst="straightConnector1">
-            <a:avLst/>
-          </a:prstGeom>
-          <a:ln w="19050">
-            <a:solidFill>
-              <a:srgbClr val="0070C0"/>
-            </a:solidFill>
-            <a:prstDash val="sysDash"/>
-            <a:headEnd type="arrow" w="med" len="med"/>
-            <a:tailEnd type="none" w="med" len="med"/>
-          </a:ln>
-        </p:spPr>
-        <p:style>
-          <a:lnRef idx="1">
-            <a:schemeClr val="accent1"/>
-          </a:lnRef>
-          <a:fillRef idx="0">
-            <a:schemeClr val="accent1"/>
-          </a:fillRef>
-          <a:effectRef idx="0">
-            <a:schemeClr val="accent1"/>
-          </a:effectRef>
-          <a:fontRef idx="minor">
-            <a:schemeClr val="tx1"/>
-          </a:fontRef>
-        </p:style>
-      </p:cxnSp>
-      <p:sp>
-        <p:nvSpPr>
-          <p:cNvPr id="78" name="TextBox 77"/>
+      <p:sp>
+        <p:nvSpPr>
+          <p:cNvPr id="80" name="TextBox 79"/>
           <p:cNvSpPr txBox="1"/>
           <p:nvPr/>
         </p:nvSpPr>
         <p:spPr>
           <a:xfrm>
-            <a:off x="5448568" y="4286627"/>
-            <a:ext cx="1653488" cy="215444"/>
+            <a:off x="1903358" y="2384535"/>
+            <a:ext cx="1424846" cy="215444"/>
           </a:xfrm>
           <a:prstGeom prst="rect">
             <a:avLst/>
@@ -4482,31 +4346,27 @@
           </a:lstStyle>
           <a:p>
             <a:r>
-              <a:rPr lang="en-US" dirty="0" smtClean="0">
-                <a:solidFill>
-                  <a:srgbClr val="7030A0"/>
-                </a:solidFill>
-              </a:rPr>
-              <a:t>journalWindow.show()</a:t>
-            </a:r>
-            <a:endParaRPr lang="en-US" dirty="0">
-              <a:solidFill>
-                <a:srgbClr val="7030A0"/>
-              </a:solidFill>
-            </a:endParaRPr>
-          </a:p>
-        </p:txBody>
-      </p:sp>
-      <p:sp>
-        <p:nvSpPr>
-          <p:cNvPr id="80" name="TextBox 79"/>
+              <a:rPr lang="en-US" dirty="0"/>
+              <a:t>parse</a:t>
+            </a:r>
+            <a:r>
+              <a:rPr lang="en-US" dirty="0" smtClean="0"/>
+              <a:t>(“new”)</a:t>
+            </a:r>
+            <a:endParaRPr lang="en-US" dirty="0"/>
+          </a:p>
+        </p:txBody>
+      </p:sp>
+      <p:sp>
+        <p:nvSpPr>
+          <p:cNvPr id="82" name="TextBox 81"/>
           <p:cNvSpPr txBox="1"/>
           <p:nvPr/>
         </p:nvSpPr>
         <p:spPr>
           <a:xfrm>
-            <a:off x="1524000" y="2819400"/>
-            <a:ext cx="1424846" cy="215444"/>
+            <a:off x="4765328" y="4376053"/>
+            <a:ext cx="621216" cy="215444"/>
           </a:xfrm>
           <a:prstGeom prst="rect">
             <a:avLst/>
@@ -4532,26 +4392,21 @@
           <a:p>
             <a:r>
               <a:rPr lang="en-US" dirty="0"/>
-              <a:t>parse</a:t>
-            </a:r>
-            <a:r>
-              <a:rPr lang="en-US" dirty="0" smtClean="0"/>
-              <a:t>(“new”)</a:t>
-            </a:r>
-            <a:endParaRPr lang="en-US" dirty="0"/>
-          </a:p>
-        </p:txBody>
-      </p:sp>
-      <p:sp>
-        <p:nvSpPr>
-          <p:cNvPr id="82" name="TextBox 81"/>
+              <a:t>result</a:t>
+            </a:r>
+          </a:p>
+        </p:txBody>
+      </p:sp>
+      <p:sp>
+        <p:nvSpPr>
+          <p:cNvPr id="83" name="TextBox 82"/>
           <p:cNvSpPr txBox="1"/>
           <p:nvPr/>
         </p:nvSpPr>
         <p:spPr>
           <a:xfrm>
-            <a:off x="4385970" y="4810918"/>
-            <a:ext cx="621216" cy="215444"/>
+            <a:off x="979341" y="5103623"/>
+            <a:ext cx="762000" cy="215444"/>
           </a:xfrm>
           <a:prstGeom prst="rect">
             <a:avLst/>
@@ -4584,14 +4439,14 @@
       </p:sp>
       <p:sp>
         <p:nvSpPr>
-          <p:cNvPr id="83" name="TextBox 82"/>
+          <p:cNvPr id="93" name="TextBox 92"/>
           <p:cNvSpPr txBox="1"/>
           <p:nvPr/>
         </p:nvSpPr>
         <p:spPr>
           <a:xfrm>
-            <a:off x="599983" y="5538488"/>
-            <a:ext cx="762000" cy="215444"/>
+            <a:off x="2790624" y="2835349"/>
+            <a:ext cx="434269" cy="215444"/>
           </a:xfrm>
           <a:prstGeom prst="rect">
             <a:avLst/>
@@ -4616,46 +4471,6 @@
           </a:lstStyle>
           <a:p>
             <a:r>
-              <a:rPr lang="en-US" dirty="0"/>
-              <a:t>result</a:t>
-            </a:r>
-          </a:p>
-        </p:txBody>
-      </p:sp>
-      <p:sp>
-        <p:nvSpPr>
-          <p:cNvPr id="93" name="TextBox 92"/>
-          <p:cNvSpPr txBox="1"/>
-          <p:nvPr/>
-        </p:nvSpPr>
-        <p:spPr>
-          <a:xfrm>
-            <a:off x="2411266" y="3270214"/>
-            <a:ext cx="434269" cy="215444"/>
-          </a:xfrm>
-          <a:prstGeom prst="rect">
-            <a:avLst/>
-          </a:prstGeom>
-          <a:noFill/>
-        </p:spPr>
-        <p:txBody>
-          <a:bodyPr wrap="square" lIns="0" tIns="0" rIns="0" bIns="0" rtlCol="0">
-            <a:spAutoFit/>
-          </a:bodyPr>
-          <a:lstStyle>
-            <a:defPPr>
-              <a:defRPr lang="en-US"/>
-            </a:defPPr>
-            <a:lvl1pPr algn="r">
-              <a:defRPr sz="1400">
-                <a:solidFill>
-                  <a:srgbClr val="0070C0"/>
-                </a:solidFill>
-              </a:defRPr>
-            </a:lvl1pPr>
-          </a:lstStyle>
-          <a:p>
-            <a:r>
               <a:rPr lang="en-US" dirty="0" smtClean="0"/>
               <a:t>result</a:t>
             </a:r>
@@ -4671,7 +4486,7 @@
         </p:nvSpPr>
         <p:spPr>
           <a:xfrm>
-            <a:off x="3275453" y="2959608"/>
+            <a:off x="3654811" y="2524743"/>
             <a:ext cx="1603059" cy="290183"/>
           </a:xfrm>
           <a:prstGeom prst="rect">
@@ -4730,7 +4545,7 @@
         </p:nvSpPr>
         <p:spPr>
           <a:xfrm>
-            <a:off x="3971897" y="3849624"/>
+            <a:off x="4351255" y="3414759"/>
             <a:ext cx="188623" cy="420194"/>
           </a:xfrm>
           <a:prstGeom prst="rect">
@@ -4777,7 +4592,7 @@
         </p:nvCxnSpPr>
         <p:spPr>
           <a:xfrm flipH="1">
-            <a:off x="4066208" y="3200400"/>
+            <a:off x="4445566" y="2765535"/>
             <a:ext cx="6680" cy="1193949"/>
           </a:xfrm>
           <a:prstGeom prst="line">
@@ -4814,7 +4629,7 @@
         </p:nvCxnSpPr>
         <p:spPr>
           <a:xfrm>
-            <a:off x="1548384" y="3861458"/>
+            <a:off x="1927742" y="3426593"/>
             <a:ext cx="2425417" cy="6006"/>
           </a:xfrm>
           <a:prstGeom prst="straightConnector1">
@@ -4850,7 +4665,7 @@
         </p:nvSpPr>
         <p:spPr>
           <a:xfrm>
-            <a:off x="3971897" y="3264408"/>
+            <a:off x="4351255" y="2829543"/>
             <a:ext cx="188623" cy="184610"/>
           </a:xfrm>
           <a:prstGeom prst="rect">
@@ -4897,7 +4712,7 @@
         </p:nvCxnSpPr>
         <p:spPr>
           <a:xfrm flipV="1">
-            <a:off x="2960616" y="3117583"/>
+            <a:off x="3339974" y="2682718"/>
             <a:ext cx="319474" cy="4541"/>
           </a:xfrm>
           <a:prstGeom prst="straightConnector1">
@@ -4933,7 +4748,7 @@
         </p:nvCxnSpPr>
         <p:spPr>
           <a:xfrm>
-            <a:off x="3048001" y="3439874"/>
+            <a:off x="3427359" y="3005009"/>
             <a:ext cx="966624" cy="0"/>
           </a:xfrm>
           <a:prstGeom prst="straightConnector1">
@@ -4971,7 +4786,7 @@
         </p:nvCxnSpPr>
         <p:spPr>
           <a:xfrm flipV="1">
-            <a:off x="4044790" y="3881659"/>
+            <a:off x="4424148" y="3446794"/>
             <a:ext cx="319474" cy="4541"/>
           </a:xfrm>
           <a:prstGeom prst="straightConnector1">
@@ -4999,42 +4814,6 @@
           </a:fontRef>
         </p:style>
       </p:cxnSp>
-      <p:cxnSp>
-        <p:nvCxnSpPr>
-          <p:cNvPr id="94" name="Straight Arrow Connector 93"/>
-          <p:cNvCxnSpPr/>
-          <p:nvPr/>
-        </p:nvCxnSpPr>
-        <p:spPr>
-          <a:xfrm>
-            <a:off x="5261853" y="4098353"/>
-            <a:ext cx="1962936" cy="0"/>
-          </a:xfrm>
-          <a:prstGeom prst="straightConnector1">
-            <a:avLst/>
-          </a:prstGeom>
-          <a:ln w="19050">
-            <a:solidFill>
-              <a:srgbClr val="0070C0"/>
-            </a:solidFill>
-            <a:tailEnd type="arrow"/>
-          </a:ln>
-        </p:spPr>
-        <p:style>
-          <a:lnRef idx="1">
-            <a:schemeClr val="accent1"/>
-          </a:lnRef>
-          <a:fillRef idx="0">
-            <a:schemeClr val="accent1"/>
-          </a:fillRef>
-          <a:effectRef idx="0">
-            <a:schemeClr val="accent1"/>
-          </a:effectRef>
-          <a:fontRef idx="minor">
-            <a:schemeClr val="tx1"/>
-          </a:fontRef>
-        </p:style>
-      </p:cxnSp>
       <p:sp>
         <p:nvSpPr>
           <p:cNvPr id="95" name="Rectangle 94"/>
@@ -5043,7 +4822,7 @@
         </p:nvSpPr>
         <p:spPr>
           <a:xfrm>
-            <a:off x="7224789" y="4082393"/>
+            <a:off x="7604147" y="3937332"/>
             <a:ext cx="152400" cy="199803"/>
           </a:xfrm>
           <a:prstGeom prst="rect">
@@ -5094,14 +4873,14 @@
       </p:sp>
       <p:sp>
         <p:nvSpPr>
-          <p:cNvPr id="96" name="TextBox 95"/>
+          <p:cNvPr id="42" name="TextBox 41"/>
           <p:cNvSpPr txBox="1"/>
           <p:nvPr/>
         </p:nvSpPr>
         <p:spPr>
           <a:xfrm>
-            <a:off x="5593667" y="3850841"/>
-            <a:ext cx="1653488" cy="215444"/>
+            <a:off x="5803848" y="3708132"/>
+            <a:ext cx="1587199" cy="215444"/>
           </a:xfrm>
           <a:prstGeom prst="rect">
             <a:avLst/>
@@ -5126,49 +4905,30 @@
           </a:lstStyle>
           <a:p>
             <a:r>
-              <a:rPr lang="en-US" dirty="0">
-                <a:solidFill>
-                  <a:srgbClr val="7030A0"/>
-                </a:solidFill>
-              </a:rPr>
-              <a:t>J</a:t>
-            </a:r>
-            <a:r>
-              <a:rPr lang="en-US" dirty="0" smtClean="0">
-                <a:solidFill>
-                  <a:srgbClr val="7030A0"/>
-                </a:solidFill>
-              </a:rPr>
-              <a:t>ournalWindow()</a:t>
-            </a:r>
-            <a:endParaRPr lang="en-US" dirty="0">
-              <a:solidFill>
-                <a:srgbClr val="7030A0"/>
-              </a:solidFill>
-            </a:endParaRPr>
+              <a:rPr lang="en-US" dirty="0" smtClean="0"/>
+              <a:t>HandleStage.close()</a:t>
+            </a:r>
+            <a:endParaRPr lang="en-US" dirty="0"/>
           </a:p>
         </p:txBody>
       </p:sp>
       <p:cxnSp>
         <p:nvCxnSpPr>
-          <p:cNvPr id="97" name="Straight Arrow Connector 96"/>
+          <p:cNvPr id="43" name="Straight Arrow Connector 42"/>
           <p:cNvCxnSpPr/>
           <p:nvPr/>
         </p:nvCxnSpPr>
         <p:spPr>
           <a:xfrm>
-            <a:off x="5273038" y="4275368"/>
-            <a:ext cx="1951751" cy="8759"/>
+            <a:off x="2032609" y="4137135"/>
+            <a:ext cx="5571538" cy="0"/>
           </a:xfrm>
           <a:prstGeom prst="straightConnector1">
             <a:avLst/>
           </a:prstGeom>
           <a:ln w="19050">
             <a:solidFill>
-              <a:schemeClr val="accent4">
-                <a:lumMod val="60000"/>
-                <a:lumOff val="40000"/>
-              </a:schemeClr>
+              <a:srgbClr val="0070C0"/>
             </a:solidFill>
             <a:prstDash val="sysDash"/>
             <a:headEnd type="arrow" w="med" len="med"/>

</xml_diff>